<commit_message>
Updated CNN architecture comparison image
</commit_message>
<xml_diff>
--- a/writeup/cnn_comparison.pptx
+++ b/writeup/cnn_comparison.pptx
@@ -3106,8 +3106,8 @@
           </p:nvSpPr>
           <p:spPr>
             <a:xfrm rot="16200000">
-              <a:off x="17068" y="1144107"/>
-              <a:ext cx="1007263" cy="400110"/>
+              <a:off x="-115572" y="1057136"/>
+              <a:ext cx="1222982" cy="360584"/>
             </a:xfrm>
             <a:prstGeom prst="rect">
               <a:avLst/>
@@ -3121,10 +3121,10 @@
             <a:lstStyle/>
             <a:p>
               <a:r>
-                <a:rPr lang="en-US" sz="2000" u="sng" dirty="0" smtClean="0"/>
-                <a:t>LeNet-5</a:t>
+                <a:rPr lang="en-US" u="sng" dirty="0" smtClean="0"/>
+                <a:t>(A) LeNet-5</a:t>
               </a:r>
-              <a:endParaRPr lang="en-IN" sz="2000" u="sng" dirty="0"/>
+              <a:endParaRPr lang="en-IN" u="sng" dirty="0"/>
             </a:p>
           </p:txBody>
         </p:sp>
@@ -3136,8 +3136,8 @@
           </p:nvSpPr>
           <p:spPr>
             <a:xfrm rot="16200000">
-              <a:off x="-474128" y="2916937"/>
-              <a:ext cx="1890518" cy="400110"/>
+              <a:off x="-499005" y="2936700"/>
+              <a:ext cx="1989848" cy="360584"/>
             </a:xfrm>
             <a:prstGeom prst="rect">
               <a:avLst/>
@@ -3151,10 +3151,14 @@
             <a:lstStyle/>
             <a:p>
               <a:r>
-                <a:rPr lang="en-US" sz="2000" u="sng" dirty="0" err="1" smtClean="0"/>
+                <a:rPr lang="en-US" u="sng" dirty="0" smtClean="0"/>
+                <a:t>(B) </a:t>
+              </a:r>
+              <a:r>
+                <a:rPr lang="en-US" u="sng" dirty="0" err="1" smtClean="0"/>
                 <a:t>Sermanet-Lecun</a:t>
               </a:r>
-              <a:endParaRPr lang="en-IN" sz="2000" u="sng" dirty="0"/>
+              <a:endParaRPr lang="en-IN" u="sng" dirty="0"/>
             </a:p>
           </p:txBody>
         </p:sp>
@@ -3166,8 +3170,8 @@
           </p:nvSpPr>
           <p:spPr>
             <a:xfrm rot="16200000">
-              <a:off x="17423" y="4508973"/>
-              <a:ext cx="1006558" cy="400110"/>
+              <a:off x="-109186" y="4528735"/>
+              <a:ext cx="1210210" cy="360584"/>
             </a:xfrm>
             <a:prstGeom prst="rect">
               <a:avLst/>
@@ -3181,10 +3185,14 @@
             <a:lstStyle/>
             <a:p>
               <a:r>
-                <a:rPr lang="en-US" sz="2000" u="sng" dirty="0" err="1" smtClean="0"/>
+                <a:rPr lang="en-US" u="sng" dirty="0" smtClean="0"/>
+                <a:t>(C) </a:t>
+              </a:r>
+              <a:r>
+                <a:rPr lang="en-US" u="sng" dirty="0" err="1" smtClean="0"/>
                 <a:t>AlexNet</a:t>
               </a:r>
-              <a:endParaRPr lang="en-IN" sz="2000" u="sng" dirty="0"/>
+              <a:endParaRPr lang="en-IN" u="sng" dirty="0"/>
             </a:p>
           </p:txBody>
         </p:sp>
@@ -3196,8 +3204,8 @@
           </p:nvSpPr>
           <p:spPr>
             <a:xfrm rot="16200000">
-              <a:off x="5820" y="5741095"/>
-              <a:ext cx="1029769" cy="400110"/>
+              <a:off x="-129844" y="5760858"/>
+              <a:ext cx="1251527" cy="360584"/>
             </a:xfrm>
             <a:prstGeom prst="rect">
               <a:avLst/>
@@ -3211,10 +3219,14 @@
             <a:lstStyle/>
             <a:p>
               <a:r>
-                <a:rPr lang="en-US" sz="2000" u="sng" dirty="0" err="1" smtClean="0"/>
+                <a:rPr lang="en-US" u="sng" dirty="0" smtClean="0"/>
+                <a:t>(D) </a:t>
+              </a:r>
+              <a:r>
+                <a:rPr lang="en-US" u="sng" dirty="0" err="1" smtClean="0"/>
                 <a:t>VGGNet</a:t>
               </a:r>
-              <a:endParaRPr lang="en-IN" sz="2000" u="sng" dirty="0"/>
+              <a:endParaRPr lang="en-IN" u="sng" dirty="0"/>
             </a:p>
           </p:txBody>
         </p:sp>
@@ -3272,8 +3284,8 @@
           </p:nvSpPr>
           <p:spPr>
             <a:xfrm>
-              <a:off x="232864" y="2174404"/>
-              <a:ext cx="6959787" cy="1878324"/>
+              <a:off x="232864" y="2122067"/>
+              <a:ext cx="6959787" cy="1930661"/>
             </a:xfrm>
             <a:prstGeom prst="rect">
               <a:avLst/>
@@ -3319,7 +3331,7 @@
           <p:spPr>
             <a:xfrm>
               <a:off x="232864" y="300451"/>
-              <a:ext cx="6959787" cy="1878324"/>
+              <a:ext cx="6959787" cy="1821616"/>
             </a:xfrm>
             <a:prstGeom prst="rect">
               <a:avLst/>
@@ -3410,8 +3422,8 @@
           </p:nvSpPr>
           <p:spPr>
             <a:xfrm>
-              <a:off x="8738647" y="436140"/>
-              <a:ext cx="1511952" cy="400110"/>
+              <a:off x="8536169" y="436140"/>
+              <a:ext cx="1751588" cy="390633"/>
             </a:xfrm>
             <a:prstGeom prst="rect">
               <a:avLst/>
@@ -3426,7 +3438,7 @@
             <a:p>
               <a:r>
                 <a:rPr lang="en-US" sz="2000" u="sng" dirty="0" smtClean="0"/>
-                <a:t>NVIDIA CNN</a:t>
+                <a:t>(E) NVIDIA CNN</a:t>
               </a:r>
               <a:endParaRPr lang="en-IN" sz="2000" u="sng" dirty="0"/>
             </a:p>

</xml_diff>